<commit_message>
2021/5/21 report no complete
</commit_message>
<xml_diff>
--- a/新建 Microsoft PowerPoint 演示文稿.pptx
+++ b/新建 Microsoft PowerPoint 演示文稿.pptx
@@ -6,6 +6,7 @@
   </p:sldMasterIdLst>
   <p:sldIdLst>
     <p:sldId id="256" r:id="rId2"/>
+    <p:sldId id="257" r:id="rId3"/>
   </p:sldIdLst>
   <p:sldSz cx="12192000" cy="6858000"/>
   <p:notesSz cx="6858000" cy="9144000"/>
@@ -104,6 +105,11 @@
       </a:defRPr>
     </a:lvl9pPr>
   </p:defaultTextStyle>
+  <p:extLst>
+    <p:ext uri="{EFAFB233-063F-42B5-8137-9DF3F51BA10A}">
+      <p15:sldGuideLst xmlns:p15="http://schemas.microsoft.com/office/powerpoint/2012/main"/>
+    </p:ext>
+  </p:extLst>
 </p:presentation>
 </file>
 
@@ -238,7 +244,7 @@
           <a:p>
             <a:fld id="{D0776C84-7513-4F8B-8E99-AE374A08201F}" type="datetimeFigureOut">
               <a:rPr lang="zh-CN" altLang="en-US" smtClean="0"/>
-              <a:t>2021/5/20</a:t>
+              <a:t>2021/5/21</a:t>
             </a:fld>
             <a:endParaRPr lang="zh-CN" altLang="en-US"/>
           </a:p>
@@ -408,7 +414,7 @@
           <a:p>
             <a:fld id="{D0776C84-7513-4F8B-8E99-AE374A08201F}" type="datetimeFigureOut">
               <a:rPr lang="zh-CN" altLang="en-US" smtClean="0"/>
-              <a:t>2021/5/20</a:t>
+              <a:t>2021/5/21</a:t>
             </a:fld>
             <a:endParaRPr lang="zh-CN" altLang="en-US"/>
           </a:p>
@@ -588,7 +594,7 @@
           <a:p>
             <a:fld id="{D0776C84-7513-4F8B-8E99-AE374A08201F}" type="datetimeFigureOut">
               <a:rPr lang="zh-CN" altLang="en-US" smtClean="0"/>
-              <a:t>2021/5/20</a:t>
+              <a:t>2021/5/21</a:t>
             </a:fld>
             <a:endParaRPr lang="zh-CN" altLang="en-US"/>
           </a:p>
@@ -758,7 +764,7 @@
           <a:p>
             <a:fld id="{D0776C84-7513-4F8B-8E99-AE374A08201F}" type="datetimeFigureOut">
               <a:rPr lang="zh-CN" altLang="en-US" smtClean="0"/>
-              <a:t>2021/5/20</a:t>
+              <a:t>2021/5/21</a:t>
             </a:fld>
             <a:endParaRPr lang="zh-CN" altLang="en-US"/>
           </a:p>
@@ -1004,7 +1010,7 @@
           <a:p>
             <a:fld id="{D0776C84-7513-4F8B-8E99-AE374A08201F}" type="datetimeFigureOut">
               <a:rPr lang="zh-CN" altLang="en-US" smtClean="0"/>
-              <a:t>2021/5/20</a:t>
+              <a:t>2021/5/21</a:t>
             </a:fld>
             <a:endParaRPr lang="zh-CN" altLang="en-US"/>
           </a:p>
@@ -1236,7 +1242,7 @@
           <a:p>
             <a:fld id="{D0776C84-7513-4F8B-8E99-AE374A08201F}" type="datetimeFigureOut">
               <a:rPr lang="zh-CN" altLang="en-US" smtClean="0"/>
-              <a:t>2021/5/20</a:t>
+              <a:t>2021/5/21</a:t>
             </a:fld>
             <a:endParaRPr lang="zh-CN" altLang="en-US"/>
           </a:p>
@@ -1603,7 +1609,7 @@
           <a:p>
             <a:fld id="{D0776C84-7513-4F8B-8E99-AE374A08201F}" type="datetimeFigureOut">
               <a:rPr lang="zh-CN" altLang="en-US" smtClean="0"/>
-              <a:t>2021/5/20</a:t>
+              <a:t>2021/5/21</a:t>
             </a:fld>
             <a:endParaRPr lang="zh-CN" altLang="en-US"/>
           </a:p>
@@ -1721,7 +1727,7 @@
           <a:p>
             <a:fld id="{D0776C84-7513-4F8B-8E99-AE374A08201F}" type="datetimeFigureOut">
               <a:rPr lang="zh-CN" altLang="en-US" smtClean="0"/>
-              <a:t>2021/5/20</a:t>
+              <a:t>2021/5/21</a:t>
             </a:fld>
             <a:endParaRPr lang="zh-CN" altLang="en-US"/>
           </a:p>
@@ -1816,7 +1822,7 @@
           <a:p>
             <a:fld id="{D0776C84-7513-4F8B-8E99-AE374A08201F}" type="datetimeFigureOut">
               <a:rPr lang="zh-CN" altLang="en-US" smtClean="0"/>
-              <a:t>2021/5/20</a:t>
+              <a:t>2021/5/21</a:t>
             </a:fld>
             <a:endParaRPr lang="zh-CN" altLang="en-US"/>
           </a:p>
@@ -2093,7 +2099,7 @@
           <a:p>
             <a:fld id="{D0776C84-7513-4F8B-8E99-AE374A08201F}" type="datetimeFigureOut">
               <a:rPr lang="zh-CN" altLang="en-US" smtClean="0"/>
-              <a:t>2021/5/20</a:t>
+              <a:t>2021/5/21</a:t>
             </a:fld>
             <a:endParaRPr lang="zh-CN" altLang="en-US"/>
           </a:p>
@@ -2346,7 +2352,7 @@
           <a:p>
             <a:fld id="{D0776C84-7513-4F8B-8E99-AE374A08201F}" type="datetimeFigureOut">
               <a:rPr lang="zh-CN" altLang="en-US" smtClean="0"/>
-              <a:t>2021/5/20</a:t>
+              <a:t>2021/5/21</a:t>
             </a:fld>
             <a:endParaRPr lang="zh-CN" altLang="en-US"/>
           </a:p>
@@ -2559,7 +2565,7 @@
           <a:p>
             <a:fld id="{D0776C84-7513-4F8B-8E99-AE374A08201F}" type="datetimeFigureOut">
               <a:rPr lang="zh-CN" altLang="en-US" smtClean="0"/>
-              <a:t>2021/5/20</a:t>
+              <a:t>2021/5/21</a:t>
             </a:fld>
             <a:endParaRPr lang="zh-CN" altLang="en-US"/>
           </a:p>
@@ -3030,7 +3036,7 @@
         </p:nvSpPr>
         <p:spPr>
           <a:xfrm>
-            <a:off x="4918840" y="3788980"/>
+            <a:off x="4918841" y="3788980"/>
             <a:ext cx="630621" cy="583324"/>
           </a:xfrm>
           <a:prstGeom prst="ellipse">
@@ -3204,10 +3210,1576 @@
           </a:p>
         </p:txBody>
       </p:sp>
+      <p:cxnSp>
+        <p:nvCxnSpPr>
+          <p:cNvPr id="3" name="直接箭头连接符 2"/>
+          <p:cNvCxnSpPr/>
+          <p:nvPr/>
+        </p:nvCxnSpPr>
+        <p:spPr>
+          <a:xfrm flipH="1">
+            <a:off x="3831021" y="2388178"/>
+            <a:ext cx="1087820" cy="0"/>
+          </a:xfrm>
+          <a:prstGeom prst="straightConnector1">
+            <a:avLst/>
+          </a:prstGeom>
+          <a:ln>
+            <a:solidFill>
+              <a:schemeClr val="tx1"/>
+            </a:solidFill>
+            <a:tailEnd type="triangle"/>
+          </a:ln>
+        </p:spPr>
+        <p:style>
+          <a:lnRef idx="1">
+            <a:schemeClr val="accent1"/>
+          </a:lnRef>
+          <a:fillRef idx="0">
+            <a:schemeClr val="accent1"/>
+          </a:fillRef>
+          <a:effectRef idx="0">
+            <a:schemeClr val="accent1"/>
+          </a:effectRef>
+          <a:fontRef idx="minor">
+            <a:schemeClr val="tx1"/>
+          </a:fontRef>
+        </p:style>
+      </p:cxnSp>
+      <p:cxnSp>
+        <p:nvCxnSpPr>
+          <p:cNvPr id="9" name="直接箭头连接符 8"/>
+          <p:cNvCxnSpPr>
+            <a:stCxn id="4" idx="6"/>
+            <a:endCxn id="7" idx="2"/>
+          </p:cNvCxnSpPr>
+          <p:nvPr/>
+        </p:nvCxnSpPr>
+        <p:spPr>
+          <a:xfrm>
+            <a:off x="3831021" y="2483069"/>
+            <a:ext cx="1087820" cy="0"/>
+          </a:xfrm>
+          <a:prstGeom prst="straightConnector1">
+            <a:avLst/>
+          </a:prstGeom>
+          <a:ln>
+            <a:solidFill>
+              <a:schemeClr val="tx1"/>
+            </a:solidFill>
+            <a:tailEnd type="triangle"/>
+          </a:ln>
+        </p:spPr>
+        <p:style>
+          <a:lnRef idx="1">
+            <a:schemeClr val="accent1"/>
+          </a:lnRef>
+          <a:fillRef idx="0">
+            <a:schemeClr val="accent1"/>
+          </a:fillRef>
+          <a:effectRef idx="0">
+            <a:schemeClr val="accent1"/>
+          </a:effectRef>
+          <a:fontRef idx="minor">
+            <a:schemeClr val="tx1"/>
+          </a:fontRef>
+        </p:style>
+      </p:cxnSp>
+      <p:cxnSp>
+        <p:nvCxnSpPr>
+          <p:cNvPr id="11" name="直接箭头连接符 10"/>
+          <p:cNvCxnSpPr>
+            <a:stCxn id="4" idx="4"/>
+            <a:endCxn id="6" idx="0"/>
+          </p:cNvCxnSpPr>
+          <p:nvPr/>
+        </p:nvCxnSpPr>
+        <p:spPr>
+          <a:xfrm>
+            <a:off x="3515711" y="2774731"/>
+            <a:ext cx="0" cy="1014249"/>
+          </a:xfrm>
+          <a:prstGeom prst="straightConnector1">
+            <a:avLst/>
+          </a:prstGeom>
+          <a:ln>
+            <a:solidFill>
+              <a:schemeClr val="tx1"/>
+            </a:solidFill>
+            <a:tailEnd type="triangle"/>
+          </a:ln>
+        </p:spPr>
+        <p:style>
+          <a:lnRef idx="1">
+            <a:schemeClr val="accent1"/>
+          </a:lnRef>
+          <a:fillRef idx="0">
+            <a:schemeClr val="accent1"/>
+          </a:fillRef>
+          <a:effectRef idx="0">
+            <a:schemeClr val="accent1"/>
+          </a:effectRef>
+          <a:fontRef idx="minor">
+            <a:schemeClr val="tx1"/>
+          </a:fontRef>
+        </p:style>
+      </p:cxnSp>
+      <p:cxnSp>
+        <p:nvCxnSpPr>
+          <p:cNvPr id="13" name="直接箭头连接符 12"/>
+          <p:cNvCxnSpPr/>
+          <p:nvPr/>
+        </p:nvCxnSpPr>
+        <p:spPr>
+          <a:xfrm flipV="1">
+            <a:off x="3576096" y="2774731"/>
+            <a:ext cx="0" cy="1014249"/>
+          </a:xfrm>
+          <a:prstGeom prst="straightConnector1">
+            <a:avLst/>
+          </a:prstGeom>
+          <a:ln>
+            <a:solidFill>
+              <a:schemeClr val="tx1"/>
+            </a:solidFill>
+            <a:tailEnd type="triangle"/>
+          </a:ln>
+        </p:spPr>
+        <p:style>
+          <a:lnRef idx="1">
+            <a:schemeClr val="accent1"/>
+          </a:lnRef>
+          <a:fillRef idx="0">
+            <a:schemeClr val="accent1"/>
+          </a:fillRef>
+          <a:effectRef idx="0">
+            <a:schemeClr val="accent1"/>
+          </a:effectRef>
+          <a:fontRef idx="minor">
+            <a:schemeClr val="tx1"/>
+          </a:fontRef>
+        </p:style>
+      </p:cxnSp>
+      <p:cxnSp>
+        <p:nvCxnSpPr>
+          <p:cNvPr id="15" name="直接箭头连接符 14"/>
+          <p:cNvCxnSpPr>
+            <a:stCxn id="6" idx="6"/>
+            <a:endCxn id="5" idx="2"/>
+          </p:cNvCxnSpPr>
+          <p:nvPr/>
+        </p:nvCxnSpPr>
+        <p:spPr>
+          <a:xfrm>
+            <a:off x="3831021" y="4080642"/>
+            <a:ext cx="1087820" cy="0"/>
+          </a:xfrm>
+          <a:prstGeom prst="straightConnector1">
+            <a:avLst/>
+          </a:prstGeom>
+          <a:ln>
+            <a:solidFill>
+              <a:schemeClr val="tx1"/>
+            </a:solidFill>
+            <a:tailEnd type="triangle"/>
+          </a:ln>
+        </p:spPr>
+        <p:style>
+          <a:lnRef idx="1">
+            <a:schemeClr val="accent1"/>
+          </a:lnRef>
+          <a:fillRef idx="0">
+            <a:schemeClr val="accent1"/>
+          </a:fillRef>
+          <a:effectRef idx="0">
+            <a:schemeClr val="accent1"/>
+          </a:effectRef>
+          <a:fontRef idx="minor">
+            <a:schemeClr val="tx1"/>
+          </a:fontRef>
+        </p:style>
+      </p:cxnSp>
+      <p:cxnSp>
+        <p:nvCxnSpPr>
+          <p:cNvPr id="17" name="直接箭头连接符 16"/>
+          <p:cNvCxnSpPr/>
+          <p:nvPr/>
+        </p:nvCxnSpPr>
+        <p:spPr>
+          <a:xfrm flipH="1">
+            <a:off x="3831021" y="4175533"/>
+            <a:ext cx="1087819" cy="0"/>
+          </a:xfrm>
+          <a:prstGeom prst="straightConnector1">
+            <a:avLst/>
+          </a:prstGeom>
+          <a:ln>
+            <a:solidFill>
+              <a:schemeClr val="tx1"/>
+            </a:solidFill>
+            <a:tailEnd type="triangle"/>
+          </a:ln>
+        </p:spPr>
+        <p:style>
+          <a:lnRef idx="1">
+            <a:schemeClr val="accent1"/>
+          </a:lnRef>
+          <a:fillRef idx="0">
+            <a:schemeClr val="accent1"/>
+          </a:fillRef>
+          <a:effectRef idx="0">
+            <a:schemeClr val="accent1"/>
+          </a:effectRef>
+          <a:fontRef idx="minor">
+            <a:schemeClr val="tx1"/>
+          </a:fontRef>
+        </p:style>
+      </p:cxnSp>
+      <p:cxnSp>
+        <p:nvCxnSpPr>
+          <p:cNvPr id="19" name="曲线连接符 18"/>
+          <p:cNvCxnSpPr>
+            <a:stCxn id="7" idx="0"/>
+            <a:endCxn id="7" idx="6"/>
+          </p:cNvCxnSpPr>
+          <p:nvPr/>
+        </p:nvCxnSpPr>
+        <p:spPr>
+          <a:xfrm rot="16200000" flipH="1">
+            <a:off x="5245976" y="2179583"/>
+            <a:ext cx="291662" cy="315310"/>
+          </a:xfrm>
+          <a:prstGeom prst="curvedConnector4">
+            <a:avLst>
+              <a:gd name="adj1" fmla="val -78378"/>
+              <a:gd name="adj2" fmla="val 172500"/>
+            </a:avLst>
+          </a:prstGeom>
+          <a:ln>
+            <a:solidFill>
+              <a:schemeClr val="tx1"/>
+            </a:solidFill>
+            <a:tailEnd type="triangle"/>
+          </a:ln>
+        </p:spPr>
+        <p:style>
+          <a:lnRef idx="1">
+            <a:schemeClr val="accent1"/>
+          </a:lnRef>
+          <a:fillRef idx="0">
+            <a:schemeClr val="accent1"/>
+          </a:fillRef>
+          <a:effectRef idx="0">
+            <a:schemeClr val="accent1"/>
+          </a:effectRef>
+          <a:fontRef idx="minor">
+            <a:schemeClr val="tx1"/>
+          </a:fontRef>
+        </p:style>
+      </p:cxnSp>
+      <p:cxnSp>
+        <p:nvCxnSpPr>
+          <p:cNvPr id="21" name="曲线连接符 20"/>
+          <p:cNvCxnSpPr>
+            <a:stCxn id="5" idx="0"/>
+            <a:endCxn id="5" idx="6"/>
+          </p:cNvCxnSpPr>
+          <p:nvPr/>
+        </p:nvCxnSpPr>
+        <p:spPr>
+          <a:xfrm rot="16200000" flipH="1">
+            <a:off x="5245976" y="3777156"/>
+            <a:ext cx="291662" cy="315310"/>
+          </a:xfrm>
+          <a:prstGeom prst="curvedConnector4">
+            <a:avLst>
+              <a:gd name="adj1" fmla="val -78378"/>
+              <a:gd name="adj2" fmla="val 172500"/>
+            </a:avLst>
+          </a:prstGeom>
+          <a:ln>
+            <a:solidFill>
+              <a:schemeClr val="tx1"/>
+            </a:solidFill>
+            <a:tailEnd type="triangle"/>
+          </a:ln>
+        </p:spPr>
+        <p:style>
+          <a:lnRef idx="1">
+            <a:schemeClr val="accent1"/>
+          </a:lnRef>
+          <a:fillRef idx="0">
+            <a:schemeClr val="accent1"/>
+          </a:fillRef>
+          <a:effectRef idx="0">
+            <a:schemeClr val="accent1"/>
+          </a:effectRef>
+          <a:fontRef idx="minor">
+            <a:schemeClr val="tx1"/>
+          </a:fontRef>
+        </p:style>
+      </p:cxnSp>
+      <p:sp>
+        <p:nvSpPr>
+          <p:cNvPr id="22" name="文本框 21"/>
+          <p:cNvSpPr txBox="1"/>
+          <p:nvPr/>
+        </p:nvSpPr>
+        <p:spPr>
+          <a:xfrm>
+            <a:off x="2775877" y="2981032"/>
+            <a:ext cx="800219" cy="276999"/>
+          </a:xfrm>
+          <a:prstGeom prst="rect">
+            <a:avLst/>
+          </a:prstGeom>
+          <a:noFill/>
+        </p:spPr>
+        <p:txBody>
+          <a:bodyPr wrap="none" rtlCol="0">
+            <a:spAutoFit/>
+          </a:bodyPr>
+          <a:lstStyle/>
+          <a:p>
+            <a:r>
+              <a:rPr lang="zh-CN" altLang="en-US" sz="1200" dirty="0" smtClean="0"/>
+              <a:t>发生跳转</a:t>
+            </a:r>
+            <a:endParaRPr lang="zh-CN" altLang="en-US" dirty="0"/>
+          </a:p>
+        </p:txBody>
+      </p:sp>
+      <p:sp>
+        <p:nvSpPr>
+          <p:cNvPr id="23" name="文本框 22"/>
+          <p:cNvSpPr txBox="1"/>
+          <p:nvPr/>
+        </p:nvSpPr>
+        <p:spPr>
+          <a:xfrm>
+            <a:off x="5651221" y="3511980"/>
+            <a:ext cx="800219" cy="276999"/>
+          </a:xfrm>
+          <a:prstGeom prst="rect">
+            <a:avLst/>
+          </a:prstGeom>
+          <a:noFill/>
+        </p:spPr>
+        <p:txBody>
+          <a:bodyPr wrap="none" rtlCol="0">
+            <a:spAutoFit/>
+          </a:bodyPr>
+          <a:lstStyle/>
+          <a:p>
+            <a:r>
+              <a:rPr lang="zh-CN" altLang="en-US" sz="1200" dirty="0" smtClean="0"/>
+              <a:t>发生跳转</a:t>
+            </a:r>
+            <a:endParaRPr lang="zh-CN" altLang="en-US" dirty="0"/>
+          </a:p>
+        </p:txBody>
+      </p:sp>
+      <p:sp>
+        <p:nvSpPr>
+          <p:cNvPr id="24" name="文本框 23"/>
+          <p:cNvSpPr txBox="1"/>
+          <p:nvPr/>
+        </p:nvSpPr>
+        <p:spPr>
+          <a:xfrm>
+            <a:off x="4061532" y="2165957"/>
+            <a:ext cx="800219" cy="276999"/>
+          </a:xfrm>
+          <a:prstGeom prst="rect">
+            <a:avLst/>
+          </a:prstGeom>
+          <a:noFill/>
+        </p:spPr>
+        <p:txBody>
+          <a:bodyPr wrap="none" rtlCol="0">
+            <a:spAutoFit/>
+          </a:bodyPr>
+          <a:lstStyle/>
+          <a:p>
+            <a:r>
+              <a:rPr lang="zh-CN" altLang="en-US" sz="1200" dirty="0" smtClean="0"/>
+              <a:t>发生跳转</a:t>
+            </a:r>
+            <a:endParaRPr lang="zh-CN" altLang="en-US" dirty="0"/>
+          </a:p>
+        </p:txBody>
+      </p:sp>
+      <p:sp>
+        <p:nvSpPr>
+          <p:cNvPr id="25" name="文本框 24"/>
+          <p:cNvSpPr txBox="1"/>
+          <p:nvPr/>
+        </p:nvSpPr>
+        <p:spPr>
+          <a:xfrm>
+            <a:off x="3960966" y="3796310"/>
+            <a:ext cx="800219" cy="276999"/>
+          </a:xfrm>
+          <a:prstGeom prst="rect">
+            <a:avLst/>
+          </a:prstGeom>
+          <a:noFill/>
+        </p:spPr>
+        <p:txBody>
+          <a:bodyPr wrap="none" rtlCol="0">
+            <a:spAutoFit/>
+          </a:bodyPr>
+          <a:lstStyle/>
+          <a:p>
+            <a:r>
+              <a:rPr lang="zh-CN" altLang="en-US" sz="1200" dirty="0" smtClean="0"/>
+              <a:t>发生跳转</a:t>
+            </a:r>
+            <a:endParaRPr lang="zh-CN" altLang="en-US" dirty="0"/>
+          </a:p>
+        </p:txBody>
+      </p:sp>
+      <p:sp>
+        <p:nvSpPr>
+          <p:cNvPr id="26" name="文本框 25"/>
+          <p:cNvSpPr txBox="1"/>
+          <p:nvPr/>
+        </p:nvSpPr>
+        <p:spPr>
+          <a:xfrm>
+            <a:off x="5660388" y="1883215"/>
+            <a:ext cx="646331" cy="276999"/>
+          </a:xfrm>
+          <a:prstGeom prst="rect">
+            <a:avLst/>
+          </a:prstGeom>
+          <a:noFill/>
+        </p:spPr>
+        <p:txBody>
+          <a:bodyPr wrap="none" rtlCol="0">
+            <a:spAutoFit/>
+          </a:bodyPr>
+          <a:lstStyle/>
+          <a:p>
+            <a:r>
+              <a:rPr lang="zh-CN" altLang="en-US" sz="1200" dirty="0" smtClean="0"/>
+              <a:t>未跳转</a:t>
+            </a:r>
+            <a:endParaRPr lang="zh-CN" altLang="en-US" dirty="0"/>
+          </a:p>
+        </p:txBody>
+      </p:sp>
+      <p:sp>
+        <p:nvSpPr>
+          <p:cNvPr id="27" name="文本框 26"/>
+          <p:cNvSpPr txBox="1"/>
+          <p:nvPr/>
+        </p:nvSpPr>
+        <p:spPr>
+          <a:xfrm>
+            <a:off x="3888111" y="2457619"/>
+            <a:ext cx="646331" cy="276999"/>
+          </a:xfrm>
+          <a:prstGeom prst="rect">
+            <a:avLst/>
+          </a:prstGeom>
+          <a:noFill/>
+        </p:spPr>
+        <p:txBody>
+          <a:bodyPr wrap="none" rtlCol="0">
+            <a:spAutoFit/>
+          </a:bodyPr>
+          <a:lstStyle/>
+          <a:p>
+            <a:r>
+              <a:rPr lang="zh-CN" altLang="en-US" sz="1200" dirty="0" smtClean="0"/>
+              <a:t>未跳转</a:t>
+            </a:r>
+            <a:endParaRPr lang="zh-CN" altLang="en-US" dirty="0"/>
+          </a:p>
+        </p:txBody>
+      </p:sp>
+      <p:sp>
+        <p:nvSpPr>
+          <p:cNvPr id="28" name="文本框 27"/>
+          <p:cNvSpPr txBox="1"/>
+          <p:nvPr/>
+        </p:nvSpPr>
+        <p:spPr>
+          <a:xfrm>
+            <a:off x="3507534" y="3322541"/>
+            <a:ext cx="646331" cy="276999"/>
+          </a:xfrm>
+          <a:prstGeom prst="rect">
+            <a:avLst/>
+          </a:prstGeom>
+          <a:noFill/>
+        </p:spPr>
+        <p:txBody>
+          <a:bodyPr wrap="none" rtlCol="0">
+            <a:spAutoFit/>
+          </a:bodyPr>
+          <a:lstStyle/>
+          <a:p>
+            <a:r>
+              <a:rPr lang="zh-CN" altLang="en-US" sz="1200" dirty="0" smtClean="0"/>
+              <a:t>未跳转</a:t>
+            </a:r>
+            <a:endParaRPr lang="zh-CN" altLang="en-US" dirty="0"/>
+          </a:p>
+        </p:txBody>
+      </p:sp>
+      <p:sp>
+        <p:nvSpPr>
+          <p:cNvPr id="29" name="文本框 28"/>
+          <p:cNvSpPr txBox="1"/>
+          <p:nvPr/>
+        </p:nvSpPr>
+        <p:spPr>
+          <a:xfrm>
+            <a:off x="3925017" y="4193690"/>
+            <a:ext cx="646331" cy="276999"/>
+          </a:xfrm>
+          <a:prstGeom prst="rect">
+            <a:avLst/>
+          </a:prstGeom>
+          <a:noFill/>
+        </p:spPr>
+        <p:txBody>
+          <a:bodyPr wrap="none" rtlCol="0">
+            <a:spAutoFit/>
+          </a:bodyPr>
+          <a:lstStyle/>
+          <a:p>
+            <a:r>
+              <a:rPr lang="zh-CN" altLang="en-US" sz="1200" dirty="0" smtClean="0"/>
+              <a:t>未跳转</a:t>
+            </a:r>
+            <a:endParaRPr lang="zh-CN" altLang="en-US" dirty="0"/>
+          </a:p>
+        </p:txBody>
+      </p:sp>
+      <p:cxnSp>
+        <p:nvCxnSpPr>
+          <p:cNvPr id="31" name="直接连接符 30"/>
+          <p:cNvCxnSpPr/>
+          <p:nvPr/>
+        </p:nvCxnSpPr>
+        <p:spPr>
+          <a:xfrm>
+            <a:off x="2314575" y="3281080"/>
+            <a:ext cx="5334000" cy="0"/>
+          </a:xfrm>
+          <a:prstGeom prst="line">
+            <a:avLst/>
+          </a:prstGeom>
+          <a:ln>
+            <a:solidFill>
+              <a:schemeClr val="tx1"/>
+            </a:solidFill>
+          </a:ln>
+        </p:spPr>
+        <p:style>
+          <a:lnRef idx="1">
+            <a:schemeClr val="accent1"/>
+          </a:lnRef>
+          <a:fillRef idx="0">
+            <a:schemeClr val="accent1"/>
+          </a:fillRef>
+          <a:effectRef idx="0">
+            <a:schemeClr val="accent1"/>
+          </a:effectRef>
+          <a:fontRef idx="minor">
+            <a:schemeClr val="tx1"/>
+          </a:fontRef>
+        </p:style>
+      </p:cxnSp>
+      <p:sp>
+        <p:nvSpPr>
+          <p:cNvPr id="32" name="文本框 31"/>
+          <p:cNvSpPr txBox="1"/>
+          <p:nvPr/>
+        </p:nvSpPr>
+        <p:spPr>
+          <a:xfrm>
+            <a:off x="1566846" y="2962621"/>
+            <a:ext cx="1261884" cy="276999"/>
+          </a:xfrm>
+          <a:prstGeom prst="rect">
+            <a:avLst/>
+          </a:prstGeom>
+          <a:noFill/>
+        </p:spPr>
+        <p:txBody>
+          <a:bodyPr wrap="none" rtlCol="0">
+            <a:spAutoFit/>
+          </a:bodyPr>
+          <a:lstStyle/>
+          <a:p>
+            <a:r>
+              <a:rPr lang="zh-CN" altLang="en-US" sz="1200" dirty="0" smtClean="0"/>
+              <a:t>预测分支不跳转</a:t>
+            </a:r>
+            <a:endParaRPr lang="zh-CN" altLang="en-US" dirty="0"/>
+          </a:p>
+        </p:txBody>
+      </p:sp>
+      <p:sp>
+        <p:nvSpPr>
+          <p:cNvPr id="33" name="文本框 32"/>
+          <p:cNvSpPr txBox="1"/>
+          <p:nvPr/>
+        </p:nvSpPr>
+        <p:spPr>
+          <a:xfrm>
+            <a:off x="1557268" y="3304986"/>
+            <a:ext cx="1107996" cy="276999"/>
+          </a:xfrm>
+          <a:prstGeom prst="rect">
+            <a:avLst/>
+          </a:prstGeom>
+          <a:noFill/>
+        </p:spPr>
+        <p:txBody>
+          <a:bodyPr wrap="none" rtlCol="0">
+            <a:spAutoFit/>
+          </a:bodyPr>
+          <a:lstStyle/>
+          <a:p>
+            <a:r>
+              <a:rPr lang="zh-CN" altLang="en-US" sz="1200" dirty="0" smtClean="0"/>
+              <a:t>预测分支跳转</a:t>
+            </a:r>
+            <a:endParaRPr lang="zh-CN" altLang="en-US" dirty="0"/>
+          </a:p>
+        </p:txBody>
+      </p:sp>
     </p:spTree>
     <p:extLst>
       <p:ext uri="{BB962C8B-B14F-4D97-AF65-F5344CB8AC3E}">
         <p14:creationId xmlns:p14="http://schemas.microsoft.com/office/powerpoint/2010/main" val="1521052516"/>
+      </p:ext>
+    </p:extLst>
+  </p:cSld>
+  <p:clrMapOvr>
+    <a:masterClrMapping/>
+  </p:clrMapOvr>
+</p:sld>
+</file>
+
+<file path=ppt/slides/slide2.xml><?xml version="1.0" encoding="utf-8"?>
+<p:sld xmlns:a="http://schemas.openxmlformats.org/drawingml/2006/main" xmlns:r="http://schemas.openxmlformats.org/officeDocument/2006/relationships" xmlns:p="http://schemas.openxmlformats.org/presentationml/2006/main">
+  <p:cSld>
+    <p:spTree>
+      <p:nvGrpSpPr>
+        <p:cNvPr id="1" name=""/>
+        <p:cNvGrpSpPr/>
+        <p:nvPr/>
+      </p:nvGrpSpPr>
+      <p:grpSpPr>
+        <a:xfrm>
+          <a:off x="0" y="0"/>
+          <a:ext cx="0" cy="0"/>
+          <a:chOff x="0" y="0"/>
+          <a:chExt cx="0" cy="0"/>
+        </a:xfrm>
+      </p:grpSpPr>
+      <p:sp>
+        <p:nvSpPr>
+          <p:cNvPr id="4" name="椭圆 3"/>
+          <p:cNvSpPr/>
+          <p:nvPr/>
+        </p:nvSpPr>
+        <p:spPr>
+          <a:xfrm>
+            <a:off x="3200400" y="2191407"/>
+            <a:ext cx="630621" cy="583324"/>
+          </a:xfrm>
+          <a:prstGeom prst="ellipse">
+            <a:avLst/>
+          </a:prstGeom>
+          <a:noFill/>
+          <a:ln>
+            <a:solidFill>
+              <a:schemeClr val="tx1"/>
+            </a:solidFill>
+          </a:ln>
+        </p:spPr>
+        <p:style>
+          <a:lnRef idx="2">
+            <a:schemeClr val="accent1">
+              <a:shade val="50000"/>
+            </a:schemeClr>
+          </a:lnRef>
+          <a:fillRef idx="1">
+            <a:schemeClr val="accent1"/>
+          </a:fillRef>
+          <a:effectRef idx="0">
+            <a:schemeClr val="accent1"/>
+          </a:effectRef>
+          <a:fontRef idx="minor">
+            <a:schemeClr val="lt1"/>
+          </a:fontRef>
+        </p:style>
+        <p:txBody>
+          <a:bodyPr rtlCol="0" anchor="ctr"/>
+          <a:lstStyle/>
+          <a:p>
+            <a:pPr algn="ctr"/>
+            <a:r>
+              <a:rPr lang="en-US" altLang="zh-CN" dirty="0" smtClean="0">
+                <a:solidFill>
+                  <a:schemeClr val="tx1"/>
+                </a:solidFill>
+              </a:rPr>
+              <a:t>01</a:t>
+            </a:r>
+            <a:endParaRPr lang="zh-CN" altLang="en-US" dirty="0">
+              <a:solidFill>
+                <a:schemeClr val="tx1"/>
+              </a:solidFill>
+            </a:endParaRPr>
+          </a:p>
+        </p:txBody>
+      </p:sp>
+      <p:sp>
+        <p:nvSpPr>
+          <p:cNvPr id="5" name="椭圆 4"/>
+          <p:cNvSpPr/>
+          <p:nvPr/>
+        </p:nvSpPr>
+        <p:spPr>
+          <a:xfrm>
+            <a:off x="4918841" y="3788980"/>
+            <a:ext cx="630621" cy="583324"/>
+          </a:xfrm>
+          <a:prstGeom prst="ellipse">
+            <a:avLst/>
+          </a:prstGeom>
+          <a:noFill/>
+          <a:ln>
+            <a:solidFill>
+              <a:schemeClr val="tx1"/>
+            </a:solidFill>
+          </a:ln>
+        </p:spPr>
+        <p:style>
+          <a:lnRef idx="2">
+            <a:schemeClr val="accent1">
+              <a:shade val="50000"/>
+            </a:schemeClr>
+          </a:lnRef>
+          <a:fillRef idx="1">
+            <a:schemeClr val="accent1"/>
+          </a:fillRef>
+          <a:effectRef idx="0">
+            <a:schemeClr val="accent1"/>
+          </a:effectRef>
+          <a:fontRef idx="minor">
+            <a:schemeClr val="lt1"/>
+          </a:fontRef>
+        </p:style>
+        <p:txBody>
+          <a:bodyPr rtlCol="0" anchor="ctr"/>
+          <a:lstStyle/>
+          <a:p>
+            <a:pPr algn="ctr"/>
+            <a:r>
+              <a:rPr lang="en-US" altLang="zh-CN" smtClean="0">
+                <a:solidFill>
+                  <a:schemeClr val="tx1"/>
+                </a:solidFill>
+              </a:rPr>
+              <a:t>11</a:t>
+            </a:r>
+            <a:endParaRPr lang="zh-CN" altLang="en-US" dirty="0">
+              <a:solidFill>
+                <a:schemeClr val="tx1"/>
+              </a:solidFill>
+            </a:endParaRPr>
+          </a:p>
+        </p:txBody>
+      </p:sp>
+      <p:sp>
+        <p:nvSpPr>
+          <p:cNvPr id="6" name="椭圆 5"/>
+          <p:cNvSpPr/>
+          <p:nvPr/>
+        </p:nvSpPr>
+        <p:spPr>
+          <a:xfrm>
+            <a:off x="3200400" y="3788980"/>
+            <a:ext cx="630621" cy="583324"/>
+          </a:xfrm>
+          <a:prstGeom prst="ellipse">
+            <a:avLst/>
+          </a:prstGeom>
+          <a:noFill/>
+          <a:ln>
+            <a:solidFill>
+              <a:schemeClr val="tx1"/>
+            </a:solidFill>
+          </a:ln>
+        </p:spPr>
+        <p:style>
+          <a:lnRef idx="2">
+            <a:schemeClr val="accent1">
+              <a:shade val="50000"/>
+            </a:schemeClr>
+          </a:lnRef>
+          <a:fillRef idx="1">
+            <a:schemeClr val="accent1"/>
+          </a:fillRef>
+          <a:effectRef idx="0">
+            <a:schemeClr val="accent1"/>
+          </a:effectRef>
+          <a:fontRef idx="minor">
+            <a:schemeClr val="lt1"/>
+          </a:fontRef>
+        </p:style>
+        <p:txBody>
+          <a:bodyPr rtlCol="0" anchor="ctr"/>
+          <a:lstStyle/>
+          <a:p>
+            <a:pPr algn="ctr"/>
+            <a:r>
+              <a:rPr lang="en-US" altLang="zh-CN" dirty="0">
+                <a:solidFill>
+                  <a:schemeClr val="tx1"/>
+                </a:solidFill>
+              </a:rPr>
+              <a:t>1</a:t>
+            </a:r>
+            <a:r>
+              <a:rPr lang="en-US" altLang="zh-CN" dirty="0" smtClean="0">
+                <a:solidFill>
+                  <a:schemeClr val="tx1"/>
+                </a:solidFill>
+              </a:rPr>
+              <a:t>0</a:t>
+            </a:r>
+            <a:endParaRPr lang="zh-CN" altLang="en-US" dirty="0">
+              <a:solidFill>
+                <a:schemeClr val="tx1"/>
+              </a:solidFill>
+            </a:endParaRPr>
+          </a:p>
+        </p:txBody>
+      </p:sp>
+      <p:sp>
+        <p:nvSpPr>
+          <p:cNvPr id="7" name="椭圆 6"/>
+          <p:cNvSpPr/>
+          <p:nvPr/>
+        </p:nvSpPr>
+        <p:spPr>
+          <a:xfrm>
+            <a:off x="4918841" y="2191407"/>
+            <a:ext cx="630621" cy="583324"/>
+          </a:xfrm>
+          <a:prstGeom prst="ellipse">
+            <a:avLst/>
+          </a:prstGeom>
+          <a:noFill/>
+          <a:ln>
+            <a:solidFill>
+              <a:schemeClr val="tx1"/>
+            </a:solidFill>
+          </a:ln>
+        </p:spPr>
+        <p:style>
+          <a:lnRef idx="2">
+            <a:schemeClr val="accent1">
+              <a:shade val="50000"/>
+            </a:schemeClr>
+          </a:lnRef>
+          <a:fillRef idx="1">
+            <a:schemeClr val="accent1"/>
+          </a:fillRef>
+          <a:effectRef idx="0">
+            <a:schemeClr val="accent1"/>
+          </a:effectRef>
+          <a:fontRef idx="minor">
+            <a:schemeClr val="lt1"/>
+          </a:fontRef>
+        </p:style>
+        <p:txBody>
+          <a:bodyPr rtlCol="0" anchor="ctr"/>
+          <a:lstStyle/>
+          <a:p>
+            <a:pPr algn="ctr"/>
+            <a:r>
+              <a:rPr lang="en-US" altLang="zh-CN" dirty="0" smtClean="0">
+                <a:solidFill>
+                  <a:schemeClr val="tx1"/>
+                </a:solidFill>
+              </a:rPr>
+              <a:t>00</a:t>
+            </a:r>
+            <a:endParaRPr lang="zh-CN" altLang="en-US" dirty="0">
+              <a:solidFill>
+                <a:schemeClr val="tx1"/>
+              </a:solidFill>
+            </a:endParaRPr>
+          </a:p>
+        </p:txBody>
+      </p:sp>
+      <p:cxnSp>
+        <p:nvCxnSpPr>
+          <p:cNvPr id="3" name="直接箭头连接符 2"/>
+          <p:cNvCxnSpPr/>
+          <p:nvPr/>
+        </p:nvCxnSpPr>
+        <p:spPr>
+          <a:xfrm flipH="1">
+            <a:off x="3831021" y="2388178"/>
+            <a:ext cx="1087820" cy="0"/>
+          </a:xfrm>
+          <a:prstGeom prst="straightConnector1">
+            <a:avLst/>
+          </a:prstGeom>
+          <a:ln>
+            <a:solidFill>
+              <a:schemeClr val="tx1"/>
+            </a:solidFill>
+            <a:tailEnd type="triangle"/>
+          </a:ln>
+        </p:spPr>
+        <p:style>
+          <a:lnRef idx="1">
+            <a:schemeClr val="accent1"/>
+          </a:lnRef>
+          <a:fillRef idx="0">
+            <a:schemeClr val="accent1"/>
+          </a:fillRef>
+          <a:effectRef idx="0">
+            <a:schemeClr val="accent1"/>
+          </a:effectRef>
+          <a:fontRef idx="minor">
+            <a:schemeClr val="tx1"/>
+          </a:fontRef>
+        </p:style>
+      </p:cxnSp>
+      <p:cxnSp>
+        <p:nvCxnSpPr>
+          <p:cNvPr id="9" name="直接箭头连接符 8"/>
+          <p:cNvCxnSpPr>
+            <a:stCxn id="4" idx="6"/>
+            <a:endCxn id="7" idx="2"/>
+          </p:cNvCxnSpPr>
+          <p:nvPr/>
+        </p:nvCxnSpPr>
+        <p:spPr>
+          <a:xfrm>
+            <a:off x="3831021" y="2483069"/>
+            <a:ext cx="1087820" cy="0"/>
+          </a:xfrm>
+          <a:prstGeom prst="straightConnector1">
+            <a:avLst/>
+          </a:prstGeom>
+          <a:ln>
+            <a:solidFill>
+              <a:schemeClr val="tx1"/>
+            </a:solidFill>
+            <a:tailEnd type="triangle"/>
+          </a:ln>
+        </p:spPr>
+        <p:style>
+          <a:lnRef idx="1">
+            <a:schemeClr val="accent1"/>
+          </a:lnRef>
+          <a:fillRef idx="0">
+            <a:schemeClr val="accent1"/>
+          </a:fillRef>
+          <a:effectRef idx="0">
+            <a:schemeClr val="accent1"/>
+          </a:effectRef>
+          <a:fontRef idx="minor">
+            <a:schemeClr val="tx1"/>
+          </a:fontRef>
+        </p:style>
+      </p:cxnSp>
+      <p:cxnSp>
+        <p:nvCxnSpPr>
+          <p:cNvPr id="11" name="直接箭头连接符 10"/>
+          <p:cNvCxnSpPr>
+            <a:stCxn id="4" idx="4"/>
+            <a:endCxn id="6" idx="0"/>
+          </p:cNvCxnSpPr>
+          <p:nvPr/>
+        </p:nvCxnSpPr>
+        <p:spPr>
+          <a:xfrm>
+            <a:off x="3515711" y="2774731"/>
+            <a:ext cx="0" cy="1014249"/>
+          </a:xfrm>
+          <a:prstGeom prst="straightConnector1">
+            <a:avLst/>
+          </a:prstGeom>
+          <a:ln>
+            <a:solidFill>
+              <a:schemeClr val="tx1"/>
+            </a:solidFill>
+            <a:tailEnd type="triangle"/>
+          </a:ln>
+        </p:spPr>
+        <p:style>
+          <a:lnRef idx="1">
+            <a:schemeClr val="accent1"/>
+          </a:lnRef>
+          <a:fillRef idx="0">
+            <a:schemeClr val="accent1"/>
+          </a:fillRef>
+          <a:effectRef idx="0">
+            <a:schemeClr val="accent1"/>
+          </a:effectRef>
+          <a:fontRef idx="minor">
+            <a:schemeClr val="tx1"/>
+          </a:fontRef>
+        </p:style>
+      </p:cxnSp>
+      <p:cxnSp>
+        <p:nvCxnSpPr>
+          <p:cNvPr id="13" name="直接箭头连接符 12"/>
+          <p:cNvCxnSpPr/>
+          <p:nvPr/>
+        </p:nvCxnSpPr>
+        <p:spPr>
+          <a:xfrm flipV="1">
+            <a:off x="3576096" y="2774731"/>
+            <a:ext cx="0" cy="1014249"/>
+          </a:xfrm>
+          <a:prstGeom prst="straightConnector1">
+            <a:avLst/>
+          </a:prstGeom>
+          <a:ln>
+            <a:solidFill>
+              <a:schemeClr val="tx1"/>
+            </a:solidFill>
+            <a:tailEnd type="triangle"/>
+          </a:ln>
+        </p:spPr>
+        <p:style>
+          <a:lnRef idx="1">
+            <a:schemeClr val="accent1"/>
+          </a:lnRef>
+          <a:fillRef idx="0">
+            <a:schemeClr val="accent1"/>
+          </a:fillRef>
+          <a:effectRef idx="0">
+            <a:schemeClr val="accent1"/>
+          </a:effectRef>
+          <a:fontRef idx="minor">
+            <a:schemeClr val="tx1"/>
+          </a:fontRef>
+        </p:style>
+      </p:cxnSp>
+      <p:cxnSp>
+        <p:nvCxnSpPr>
+          <p:cNvPr id="15" name="直接箭头连接符 14"/>
+          <p:cNvCxnSpPr>
+            <a:stCxn id="6" idx="6"/>
+            <a:endCxn id="5" idx="2"/>
+          </p:cNvCxnSpPr>
+          <p:nvPr/>
+        </p:nvCxnSpPr>
+        <p:spPr>
+          <a:xfrm>
+            <a:off x="3831021" y="4080642"/>
+            <a:ext cx="1087820" cy="0"/>
+          </a:xfrm>
+          <a:prstGeom prst="straightConnector1">
+            <a:avLst/>
+          </a:prstGeom>
+          <a:ln>
+            <a:solidFill>
+              <a:schemeClr val="tx1"/>
+            </a:solidFill>
+            <a:tailEnd type="triangle"/>
+          </a:ln>
+        </p:spPr>
+        <p:style>
+          <a:lnRef idx="1">
+            <a:schemeClr val="accent1"/>
+          </a:lnRef>
+          <a:fillRef idx="0">
+            <a:schemeClr val="accent1"/>
+          </a:fillRef>
+          <a:effectRef idx="0">
+            <a:schemeClr val="accent1"/>
+          </a:effectRef>
+          <a:fontRef idx="minor">
+            <a:schemeClr val="tx1"/>
+          </a:fontRef>
+        </p:style>
+      </p:cxnSp>
+      <p:cxnSp>
+        <p:nvCxnSpPr>
+          <p:cNvPr id="17" name="直接箭头连接符 16"/>
+          <p:cNvCxnSpPr/>
+          <p:nvPr/>
+        </p:nvCxnSpPr>
+        <p:spPr>
+          <a:xfrm flipH="1">
+            <a:off x="3831021" y="4175533"/>
+            <a:ext cx="1087819" cy="0"/>
+          </a:xfrm>
+          <a:prstGeom prst="straightConnector1">
+            <a:avLst/>
+          </a:prstGeom>
+          <a:ln>
+            <a:solidFill>
+              <a:schemeClr val="tx1"/>
+            </a:solidFill>
+            <a:tailEnd type="triangle"/>
+          </a:ln>
+        </p:spPr>
+        <p:style>
+          <a:lnRef idx="1">
+            <a:schemeClr val="accent1"/>
+          </a:lnRef>
+          <a:fillRef idx="0">
+            <a:schemeClr val="accent1"/>
+          </a:fillRef>
+          <a:effectRef idx="0">
+            <a:schemeClr val="accent1"/>
+          </a:effectRef>
+          <a:fontRef idx="minor">
+            <a:schemeClr val="tx1"/>
+          </a:fontRef>
+        </p:style>
+      </p:cxnSp>
+      <p:cxnSp>
+        <p:nvCxnSpPr>
+          <p:cNvPr id="19" name="曲线连接符 18"/>
+          <p:cNvCxnSpPr>
+            <a:stCxn id="7" idx="0"/>
+            <a:endCxn id="7" idx="6"/>
+          </p:cNvCxnSpPr>
+          <p:nvPr/>
+        </p:nvCxnSpPr>
+        <p:spPr>
+          <a:xfrm rot="16200000" flipH="1">
+            <a:off x="5245976" y="2179583"/>
+            <a:ext cx="291662" cy="315310"/>
+          </a:xfrm>
+          <a:prstGeom prst="curvedConnector4">
+            <a:avLst>
+              <a:gd name="adj1" fmla="val -78378"/>
+              <a:gd name="adj2" fmla="val 172500"/>
+            </a:avLst>
+          </a:prstGeom>
+          <a:ln>
+            <a:solidFill>
+              <a:schemeClr val="tx1"/>
+            </a:solidFill>
+            <a:tailEnd type="triangle"/>
+          </a:ln>
+        </p:spPr>
+        <p:style>
+          <a:lnRef idx="1">
+            <a:schemeClr val="accent1"/>
+          </a:lnRef>
+          <a:fillRef idx="0">
+            <a:schemeClr val="accent1"/>
+          </a:fillRef>
+          <a:effectRef idx="0">
+            <a:schemeClr val="accent1"/>
+          </a:effectRef>
+          <a:fontRef idx="minor">
+            <a:schemeClr val="tx1"/>
+          </a:fontRef>
+        </p:style>
+      </p:cxnSp>
+      <p:cxnSp>
+        <p:nvCxnSpPr>
+          <p:cNvPr id="21" name="曲线连接符 20"/>
+          <p:cNvCxnSpPr>
+            <a:stCxn id="5" idx="0"/>
+            <a:endCxn id="5" idx="6"/>
+          </p:cNvCxnSpPr>
+          <p:nvPr/>
+        </p:nvCxnSpPr>
+        <p:spPr>
+          <a:xfrm rot="16200000" flipH="1">
+            <a:off x="5245976" y="3777156"/>
+            <a:ext cx="291662" cy="315310"/>
+          </a:xfrm>
+          <a:prstGeom prst="curvedConnector4">
+            <a:avLst>
+              <a:gd name="adj1" fmla="val -78378"/>
+              <a:gd name="adj2" fmla="val 172500"/>
+            </a:avLst>
+          </a:prstGeom>
+          <a:ln>
+            <a:solidFill>
+              <a:schemeClr val="tx1"/>
+            </a:solidFill>
+            <a:tailEnd type="triangle"/>
+          </a:ln>
+        </p:spPr>
+        <p:style>
+          <a:lnRef idx="1">
+            <a:schemeClr val="accent1"/>
+          </a:lnRef>
+          <a:fillRef idx="0">
+            <a:schemeClr val="accent1"/>
+          </a:fillRef>
+          <a:effectRef idx="0">
+            <a:schemeClr val="accent1"/>
+          </a:effectRef>
+          <a:fontRef idx="minor">
+            <a:schemeClr val="tx1"/>
+          </a:fontRef>
+        </p:style>
+      </p:cxnSp>
+      <p:sp>
+        <p:nvSpPr>
+          <p:cNvPr id="24" name="文本框 23"/>
+          <p:cNvSpPr txBox="1"/>
+          <p:nvPr/>
+        </p:nvSpPr>
+        <p:spPr>
+          <a:xfrm>
+            <a:off x="4157827" y="2127122"/>
+            <a:ext cx="309700" cy="369332"/>
+          </a:xfrm>
+          <a:prstGeom prst="rect">
+            <a:avLst/>
+          </a:prstGeom>
+          <a:noFill/>
+        </p:spPr>
+        <p:txBody>
+          <a:bodyPr wrap="none" rtlCol="0">
+            <a:spAutoFit/>
+          </a:bodyPr>
+          <a:lstStyle/>
+          <a:p>
+            <a:r>
+              <a:rPr lang="en-US" altLang="zh-CN" dirty="0" smtClean="0"/>
+              <a:t>B</a:t>
+            </a:r>
+            <a:endParaRPr lang="zh-CN" altLang="en-US" dirty="0"/>
+          </a:p>
+        </p:txBody>
+      </p:sp>
+      <p:sp>
+        <p:nvSpPr>
+          <p:cNvPr id="27" name="文本框 26"/>
+          <p:cNvSpPr txBox="1"/>
+          <p:nvPr/>
+        </p:nvSpPr>
+        <p:spPr>
+          <a:xfrm>
+            <a:off x="4153865" y="2457462"/>
+            <a:ext cx="317716" cy="369332"/>
+          </a:xfrm>
+          <a:prstGeom prst="rect">
+            <a:avLst/>
+          </a:prstGeom>
+          <a:noFill/>
+        </p:spPr>
+        <p:txBody>
+          <a:bodyPr wrap="none" rtlCol="0">
+            <a:spAutoFit/>
+          </a:bodyPr>
+          <a:lstStyle/>
+          <a:p>
+            <a:r>
+              <a:rPr lang="en-US" altLang="zh-CN" dirty="0" smtClean="0"/>
+              <a:t>A</a:t>
+            </a:r>
+            <a:endParaRPr lang="zh-CN" altLang="en-US" dirty="0"/>
+          </a:p>
+        </p:txBody>
+      </p:sp>
+      <p:cxnSp>
+        <p:nvCxnSpPr>
+          <p:cNvPr id="31" name="直接连接符 30"/>
+          <p:cNvCxnSpPr/>
+          <p:nvPr/>
+        </p:nvCxnSpPr>
+        <p:spPr>
+          <a:xfrm>
+            <a:off x="2314575" y="3281080"/>
+            <a:ext cx="5334000" cy="0"/>
+          </a:xfrm>
+          <a:prstGeom prst="line">
+            <a:avLst/>
+          </a:prstGeom>
+          <a:ln>
+            <a:solidFill>
+              <a:schemeClr val="tx1"/>
+            </a:solidFill>
+          </a:ln>
+        </p:spPr>
+        <p:style>
+          <a:lnRef idx="1">
+            <a:schemeClr val="accent1"/>
+          </a:lnRef>
+          <a:fillRef idx="0">
+            <a:schemeClr val="accent1"/>
+          </a:fillRef>
+          <a:effectRef idx="0">
+            <a:schemeClr val="accent1"/>
+          </a:effectRef>
+          <a:fontRef idx="minor">
+            <a:schemeClr val="tx1"/>
+          </a:fontRef>
+        </p:style>
+      </p:cxnSp>
+      <p:sp>
+        <p:nvSpPr>
+          <p:cNvPr id="32" name="文本框 31"/>
+          <p:cNvSpPr txBox="1"/>
+          <p:nvPr/>
+        </p:nvSpPr>
+        <p:spPr>
+          <a:xfrm>
+            <a:off x="1566846" y="2962621"/>
+            <a:ext cx="1186543" cy="276999"/>
+          </a:xfrm>
+          <a:prstGeom prst="rect">
+            <a:avLst/>
+          </a:prstGeom>
+          <a:noFill/>
+        </p:spPr>
+        <p:txBody>
+          <a:bodyPr wrap="none" rtlCol="0">
+            <a:spAutoFit/>
+          </a:bodyPr>
+          <a:lstStyle/>
+          <a:p>
+            <a:r>
+              <a:rPr lang="zh-CN" altLang="en-US" sz="1200" dirty="0" smtClean="0"/>
+              <a:t>选择预测结果</a:t>
+            </a:r>
+            <a:r>
+              <a:rPr lang="en-US" altLang="zh-CN" sz="1200" dirty="0" smtClean="0"/>
+              <a:t>1</a:t>
+            </a:r>
+            <a:endParaRPr lang="zh-CN" altLang="en-US" dirty="0"/>
+          </a:p>
+        </p:txBody>
+      </p:sp>
+      <p:sp>
+        <p:nvSpPr>
+          <p:cNvPr id="33" name="文本框 32"/>
+          <p:cNvSpPr txBox="1"/>
+          <p:nvPr/>
+        </p:nvSpPr>
+        <p:spPr>
+          <a:xfrm>
+            <a:off x="1557268" y="3304986"/>
+            <a:ext cx="1186543" cy="276999"/>
+          </a:xfrm>
+          <a:prstGeom prst="rect">
+            <a:avLst/>
+          </a:prstGeom>
+          <a:noFill/>
+        </p:spPr>
+        <p:txBody>
+          <a:bodyPr wrap="none" rtlCol="0">
+            <a:spAutoFit/>
+          </a:bodyPr>
+          <a:lstStyle/>
+          <a:p>
+            <a:r>
+              <a:rPr lang="zh-CN" altLang="en-US" sz="1200" dirty="0" smtClean="0"/>
+              <a:t>选择预测结果</a:t>
+            </a:r>
+            <a:r>
+              <a:rPr lang="en-US" altLang="zh-CN" sz="1200" dirty="0" smtClean="0"/>
+              <a:t>2</a:t>
+            </a:r>
+            <a:endParaRPr lang="zh-CN" altLang="en-US" dirty="0"/>
+          </a:p>
+        </p:txBody>
+      </p:sp>
+      <p:sp>
+        <p:nvSpPr>
+          <p:cNvPr id="30" name="文本框 29"/>
+          <p:cNvSpPr txBox="1"/>
+          <p:nvPr/>
+        </p:nvSpPr>
+        <p:spPr>
+          <a:xfrm>
+            <a:off x="3192583" y="2916454"/>
+            <a:ext cx="309700" cy="369332"/>
+          </a:xfrm>
+          <a:prstGeom prst="rect">
+            <a:avLst/>
+          </a:prstGeom>
+          <a:noFill/>
+        </p:spPr>
+        <p:txBody>
+          <a:bodyPr wrap="none" rtlCol="0">
+            <a:spAutoFit/>
+          </a:bodyPr>
+          <a:lstStyle/>
+          <a:p>
+            <a:r>
+              <a:rPr lang="en-US" altLang="zh-CN" dirty="0" smtClean="0"/>
+              <a:t>B</a:t>
+            </a:r>
+            <a:endParaRPr lang="zh-CN" altLang="en-US" dirty="0"/>
+          </a:p>
+        </p:txBody>
+      </p:sp>
+      <p:sp>
+        <p:nvSpPr>
+          <p:cNvPr id="34" name="文本框 33"/>
+          <p:cNvSpPr txBox="1"/>
+          <p:nvPr/>
+        </p:nvSpPr>
+        <p:spPr>
+          <a:xfrm>
+            <a:off x="4220080" y="3781172"/>
+            <a:ext cx="309700" cy="369332"/>
+          </a:xfrm>
+          <a:prstGeom prst="rect">
+            <a:avLst/>
+          </a:prstGeom>
+          <a:noFill/>
+        </p:spPr>
+        <p:txBody>
+          <a:bodyPr wrap="none" rtlCol="0">
+            <a:spAutoFit/>
+          </a:bodyPr>
+          <a:lstStyle/>
+          <a:p>
+            <a:r>
+              <a:rPr lang="en-US" altLang="zh-CN" dirty="0" smtClean="0"/>
+              <a:t>B</a:t>
+            </a:r>
+            <a:endParaRPr lang="zh-CN" altLang="en-US" dirty="0"/>
+          </a:p>
+        </p:txBody>
+      </p:sp>
+      <p:sp>
+        <p:nvSpPr>
+          <p:cNvPr id="35" name="文本框 34"/>
+          <p:cNvSpPr txBox="1"/>
+          <p:nvPr/>
+        </p:nvSpPr>
+        <p:spPr>
+          <a:xfrm>
+            <a:off x="5709923" y="3427292"/>
+            <a:ext cx="309700" cy="369332"/>
+          </a:xfrm>
+          <a:prstGeom prst="rect">
+            <a:avLst/>
+          </a:prstGeom>
+          <a:noFill/>
+        </p:spPr>
+        <p:txBody>
+          <a:bodyPr wrap="none" rtlCol="0">
+            <a:spAutoFit/>
+          </a:bodyPr>
+          <a:lstStyle/>
+          <a:p>
+            <a:r>
+              <a:rPr lang="en-US" altLang="zh-CN" dirty="0" smtClean="0"/>
+              <a:t>B</a:t>
+            </a:r>
+            <a:endParaRPr lang="zh-CN" altLang="en-US" dirty="0"/>
+          </a:p>
+        </p:txBody>
+      </p:sp>
+      <p:sp>
+        <p:nvSpPr>
+          <p:cNvPr id="36" name="文本框 35"/>
+          <p:cNvSpPr txBox="1"/>
+          <p:nvPr/>
+        </p:nvSpPr>
+        <p:spPr>
+          <a:xfrm>
+            <a:off x="5554867" y="1715079"/>
+            <a:ext cx="317716" cy="369332"/>
+          </a:xfrm>
+          <a:prstGeom prst="rect">
+            <a:avLst/>
+          </a:prstGeom>
+          <a:noFill/>
+        </p:spPr>
+        <p:txBody>
+          <a:bodyPr wrap="none" rtlCol="0">
+            <a:spAutoFit/>
+          </a:bodyPr>
+          <a:lstStyle/>
+          <a:p>
+            <a:r>
+              <a:rPr lang="en-US" altLang="zh-CN" dirty="0" smtClean="0"/>
+              <a:t>A</a:t>
+            </a:r>
+            <a:endParaRPr lang="zh-CN" altLang="en-US" dirty="0"/>
+          </a:p>
+        </p:txBody>
+      </p:sp>
+      <p:sp>
+        <p:nvSpPr>
+          <p:cNvPr id="37" name="文本框 36"/>
+          <p:cNvSpPr txBox="1"/>
+          <p:nvPr/>
+        </p:nvSpPr>
+        <p:spPr>
+          <a:xfrm>
+            <a:off x="3525289" y="3222468"/>
+            <a:ext cx="317716" cy="369332"/>
+          </a:xfrm>
+          <a:prstGeom prst="rect">
+            <a:avLst/>
+          </a:prstGeom>
+          <a:noFill/>
+        </p:spPr>
+        <p:txBody>
+          <a:bodyPr wrap="none" rtlCol="0">
+            <a:spAutoFit/>
+          </a:bodyPr>
+          <a:lstStyle/>
+          <a:p>
+            <a:r>
+              <a:rPr lang="en-US" altLang="zh-CN" dirty="0" smtClean="0"/>
+              <a:t>A</a:t>
+            </a:r>
+            <a:endParaRPr lang="zh-CN" altLang="en-US" dirty="0"/>
+          </a:p>
+        </p:txBody>
+      </p:sp>
+      <p:sp>
+        <p:nvSpPr>
+          <p:cNvPr id="38" name="文本框 37"/>
+          <p:cNvSpPr txBox="1"/>
+          <p:nvPr/>
+        </p:nvSpPr>
+        <p:spPr>
+          <a:xfrm>
+            <a:off x="4212064" y="4141849"/>
+            <a:ext cx="317716" cy="369332"/>
+          </a:xfrm>
+          <a:prstGeom prst="rect">
+            <a:avLst/>
+          </a:prstGeom>
+          <a:noFill/>
+        </p:spPr>
+        <p:txBody>
+          <a:bodyPr wrap="none" rtlCol="0">
+            <a:spAutoFit/>
+          </a:bodyPr>
+          <a:lstStyle/>
+          <a:p>
+            <a:r>
+              <a:rPr lang="en-US" altLang="zh-CN" dirty="0" smtClean="0"/>
+              <a:t>A</a:t>
+            </a:r>
+            <a:endParaRPr lang="zh-CN" altLang="en-US" dirty="0"/>
+          </a:p>
+        </p:txBody>
+      </p:sp>
+    </p:spTree>
+    <p:extLst>
+      <p:ext uri="{BB962C8B-B14F-4D97-AF65-F5344CB8AC3E}">
+        <p14:creationId xmlns:p14="http://schemas.microsoft.com/office/powerpoint/2010/main" val="2707392561"/>
       </p:ext>
     </p:extLst>
   </p:cSld>

</xml_diff>